<commit_message>
docs : se corrige presentación
</commit_message>
<xml_diff>
--- a/01-Analisis/01-Componente metodologico/Proyecto.pptx
+++ b/01-Analisis/01-Componente metodologico/Proyecto.pptx
@@ -154,7 +154,7 @@
           <p:cNvPr id="3" name="Picture 2">
             <a:extLst>
               <a:ext uri="{FF2B5EF4-FFF2-40B4-BE49-F238E27FC236}">
-                <a16:creationId xmlns:a16="http://schemas.microsoft.com/office/drawing/2014/main" xmlns="" id="{8A6566B0-3E59-A84D-9AB2-DA05E602ADD5}"/>
+                <a16:creationId xmlns:a16="http://schemas.microsoft.com/office/drawing/2014/main" id="{8A6566B0-3E59-A84D-9AB2-DA05E602ADD5}"/>
               </a:ext>
             </a:extLst>
           </p:cNvPr>
@@ -301,7 +301,7 @@
           <a:p>
             <a:fld id="{B3030C24-9424-B24A-8613-79990C3AA492}" type="datetimeFigureOut">
               <a:rPr lang="es-ES" smtClean="0"/>
-              <a:t>20/09/2020</a:t>
+              <a:t>21/09/2020</a:t>
             </a:fld>
             <a:endParaRPr lang="es-ES"/>
           </a:p>
@@ -481,7 +481,7 @@
           <a:p>
             <a:fld id="{B3030C24-9424-B24A-8613-79990C3AA492}" type="datetimeFigureOut">
               <a:rPr lang="es-ES" smtClean="0"/>
-              <a:t>20/09/2020</a:t>
+              <a:t>21/09/2020</a:t>
             </a:fld>
             <a:endParaRPr lang="es-ES"/>
           </a:p>
@@ -564,7 +564,7 @@
           <p:cNvPr id="3" name="Picture 2">
             <a:extLst>
               <a:ext uri="{FF2B5EF4-FFF2-40B4-BE49-F238E27FC236}">
-                <a16:creationId xmlns:a16="http://schemas.microsoft.com/office/drawing/2014/main" xmlns="" id="{8477ACAF-E4FF-A844-9E41-091A7206A2B4}"/>
+                <a16:creationId xmlns:a16="http://schemas.microsoft.com/office/drawing/2014/main" id="{8477ACAF-E4FF-A844-9E41-091A7206A2B4}"/>
               </a:ext>
             </a:extLst>
           </p:cNvPr>
@@ -624,7 +624,7 @@
           <p:cNvPr id="3" name="Picture 2">
             <a:extLst>
               <a:ext uri="{FF2B5EF4-FFF2-40B4-BE49-F238E27FC236}">
-                <a16:creationId xmlns:a16="http://schemas.microsoft.com/office/drawing/2014/main" xmlns="" id="{056920DA-0831-5D43-AA82-7741662FB96F}"/>
+                <a16:creationId xmlns:a16="http://schemas.microsoft.com/office/drawing/2014/main" id="{056920DA-0831-5D43-AA82-7741662FB96F}"/>
               </a:ext>
             </a:extLst>
           </p:cNvPr>
@@ -683,7 +683,7 @@
           <p:cNvPr id="3" name="Picture 2">
             <a:extLst>
               <a:ext uri="{FF2B5EF4-FFF2-40B4-BE49-F238E27FC236}">
-                <a16:creationId xmlns:a16="http://schemas.microsoft.com/office/drawing/2014/main" xmlns="" id="{AFB3CFEF-4B3E-1E40-B352-B3A39094156E}"/>
+                <a16:creationId xmlns:a16="http://schemas.microsoft.com/office/drawing/2014/main" id="{AFB3CFEF-4B3E-1E40-B352-B3A39094156E}"/>
               </a:ext>
             </a:extLst>
           </p:cNvPr>
@@ -743,7 +743,7 @@
           <p:cNvPr id="3" name="Picture 2">
             <a:extLst>
               <a:ext uri="{FF2B5EF4-FFF2-40B4-BE49-F238E27FC236}">
-                <a16:creationId xmlns:a16="http://schemas.microsoft.com/office/drawing/2014/main" xmlns="" id="{A39422CC-C000-654E-9301-E5A5A99182F7}"/>
+                <a16:creationId xmlns:a16="http://schemas.microsoft.com/office/drawing/2014/main" id="{A39422CC-C000-654E-9301-E5A5A99182F7}"/>
               </a:ext>
             </a:extLst>
           </p:cNvPr>
@@ -803,7 +803,7 @@
           <p:cNvPr id="3" name="Picture 2">
             <a:extLst>
               <a:ext uri="{FF2B5EF4-FFF2-40B4-BE49-F238E27FC236}">
-                <a16:creationId xmlns:a16="http://schemas.microsoft.com/office/drawing/2014/main" xmlns="" id="{DA3B3542-21FA-CE4F-97EC-30221117B445}"/>
+                <a16:creationId xmlns:a16="http://schemas.microsoft.com/office/drawing/2014/main" id="{DA3B3542-21FA-CE4F-97EC-30221117B445}"/>
               </a:ext>
             </a:extLst>
           </p:cNvPr>
@@ -863,7 +863,7 @@
           <p:cNvPr id="3" name="Picture 2">
             <a:extLst>
               <a:ext uri="{FF2B5EF4-FFF2-40B4-BE49-F238E27FC236}">
-                <a16:creationId xmlns:a16="http://schemas.microsoft.com/office/drawing/2014/main" xmlns="" id="{DCFC36C6-822B-4F4E-9443-296E49B7FDEB}"/>
+                <a16:creationId xmlns:a16="http://schemas.microsoft.com/office/drawing/2014/main" id="{DCFC36C6-822B-4F4E-9443-296E49B7FDEB}"/>
               </a:ext>
             </a:extLst>
           </p:cNvPr>
@@ -1117,7 +1117,7 @@
           <a:p>
             <a:fld id="{B3030C24-9424-B24A-8613-79990C3AA492}" type="datetimeFigureOut">
               <a:rPr lang="es-ES" smtClean="0"/>
-              <a:t>20/09/2020</a:t>
+              <a:t>21/09/2020</a:t>
             </a:fld>
             <a:endParaRPr lang="es-ES"/>
           </a:p>
@@ -1370,7 +1370,7 @@
           <a:p>
             <a:fld id="{B3030C24-9424-B24A-8613-79990C3AA492}" type="datetimeFigureOut">
               <a:rPr lang="es-ES" smtClean="0"/>
-              <a:t>20/09/2020</a:t>
+              <a:t>21/09/2020</a:t>
             </a:fld>
             <a:endParaRPr lang="es-ES"/>
           </a:p>
@@ -1583,7 +1583,7 @@
           <a:p>
             <a:fld id="{B3030C24-9424-B24A-8613-79990C3AA492}" type="datetimeFigureOut">
               <a:rPr lang="es-ES" smtClean="0"/>
-              <a:t>20/09/2020</a:t>
+              <a:t>21/09/2020</a:t>
             </a:fld>
             <a:endParaRPr lang="es-ES"/>
           </a:p>
@@ -2576,7 +2576,7 @@
                   </a:schemeClr>
                 </a:solidFill>
               </a:rPr>
-              <a:t>Desarrollar un sistema de información que le permita al cliente vender sus productos con mayor facilidad y efectividad</a:t>
+              <a:t>Desarrollar un aplicativo web que le permita al cliente vender sus productos con mayor facilidad y efectividad</a:t>
             </a:r>
             <a:r>
               <a:rPr lang="es-ES" sz="2000" dirty="0">
@@ -2814,17 +2814,6 @@
               <a:buChar char="•"/>
             </a:pPr>
             <a:r>
-              <a:rPr lang="es-CO" sz="2000" dirty="0" smtClean="0">
-                <a:solidFill>
-                  <a:schemeClr val="tx1">
-                    <a:lumMod val="75000"/>
-                    <a:lumOff val="25000"/>
-                  </a:schemeClr>
-                </a:solidFill>
-              </a:rPr>
-              <a:t>Presentar </a:t>
-            </a:r>
-            <a:r>
               <a:rPr lang="es-CO" sz="2000" dirty="0">
                 <a:solidFill>
                   <a:schemeClr val="tx1">
@@ -2833,10 +2822,10 @@
                   </a:schemeClr>
                 </a:solidFill>
               </a:rPr>
-              <a:t>información pertinente acerca de los productos que vende el cliente a las demás empresas a las que esta asociado a través de un </a:t>
-            </a:r>
-            <a:r>
-              <a:rPr lang="es-CO" sz="2000" dirty="0" err="1">
+              <a:t>Presentar información pertinente acerca de los productos que vende el cliente a las demás empresas a las que esta asociado a través de un </a:t>
+            </a:r>
+            <a:r>
+              <a:rPr lang="es-CO" sz="2000" i="1" dirty="0" err="1">
                 <a:solidFill>
                   <a:schemeClr val="tx1">
                     <a:lumMod val="75000"/>
@@ -2847,6 +2836,39 @@
               <a:t>front</a:t>
             </a:r>
             <a:r>
+              <a:rPr lang="es-CO" sz="2000" i="1" dirty="0">
+                <a:solidFill>
+                  <a:schemeClr val="tx1">
+                    <a:lumMod val="75000"/>
+                    <a:lumOff val="25000"/>
+                  </a:schemeClr>
+                </a:solidFill>
+              </a:rPr>
+              <a:t> </a:t>
+            </a:r>
+            <a:r>
+              <a:rPr lang="es-CO" sz="2000" i="1" dirty="0" err="1">
+                <a:solidFill>
+                  <a:schemeClr val="tx1">
+                    <a:lumMod val="75000"/>
+                    <a:lumOff val="25000"/>
+                  </a:schemeClr>
+                </a:solidFill>
+              </a:rPr>
+              <a:t>end</a:t>
+            </a:r>
+            <a:r>
+              <a:rPr lang="es-CO" sz="2000" i="1" dirty="0">
+                <a:solidFill>
+                  <a:schemeClr val="tx1">
+                    <a:lumMod val="75000"/>
+                    <a:lumOff val="25000"/>
+                  </a:schemeClr>
+                </a:solidFill>
+              </a:rPr>
+              <a:t> </a:t>
+            </a:r>
+            <a:r>
               <a:rPr lang="es-CO" sz="2000" dirty="0">
                 <a:solidFill>
                   <a:schemeClr val="tx1">
@@ -2855,29 +2877,7 @@
                   </a:schemeClr>
                 </a:solidFill>
               </a:rPr>
-              <a:t> </a:t>
-            </a:r>
-            <a:r>
-              <a:rPr lang="es-CO" sz="2000" dirty="0" err="1">
-                <a:solidFill>
-                  <a:schemeClr val="tx1">
-                    <a:lumMod val="75000"/>
-                    <a:lumOff val="25000"/>
-                  </a:schemeClr>
-                </a:solidFill>
-              </a:rPr>
-              <a:t>end</a:t>
-            </a:r>
-            <a:r>
-              <a:rPr lang="es-CO" sz="2000" dirty="0">
-                <a:solidFill>
-                  <a:schemeClr val="tx1">
-                    <a:lumMod val="75000"/>
-                    <a:lumOff val="25000"/>
-                  </a:schemeClr>
-                </a:solidFill>
-              </a:rPr>
-              <a:t> amigable.</a:t>
+              <a:t>amigable.</a:t>
             </a:r>
           </a:p>
           <a:p>
@@ -3173,7 +3173,7 @@
                   </a:schemeClr>
                 </a:solidFill>
               </a:rPr>
-              <a:t>El proyecto se enfoca en la ciudad de  Barranquilla para la empresa Frío Nevado JL LTDA, principalmente busca suplir dos necesidades, saber:  no hay un aplicativo web en la ciudad de Barranquilla que facilite la venta repuestos para refrigeradores y le ahorre a los clientes desplazamientos largos para encontrar el repuesto, con el aplicativo los usuarios puedan consultar el repuesto que necesiten sin necesidad de ir a la tienda física;  de otro lado , la empresa debe mejorar la organización de la información (clientes, stock de los repuestos, ventas, entre otros), pues no cuenta con un modelo de organización efectiva, por lo cual un aplicativo web es una gran opción tanto para los usuarios y  clientes como para la empresa.</a:t>
+              <a:t>El proyecto se sitúa en la ciudad de  Barranquilla, concretamente en la empresa Frío Nevado JL LTDA, principalmente busca suplir dos necesidades, a saber:  la empresa no tiene  un aplicativo web que facilite la venta de repuestos para  refrigeradores y le ahorre a los clientes desplazamientos largos para encontrar el repuesto que se requiere, en ese sentido con el aplicativo los usuarios podrán consultar, cotizar y comprar sin necesidad de ir al establecimiento físico ;  de otro lado , la empresa debe mejorar la organización de la información (clientes, stock de los repuestos, ventas, entre otros), pues no cuenta con un modelo de organización efectiva, por lo cual un aplicativo web es una gran opción tanto para los usuarios y  clientes como para la empresa.</a:t>
             </a:r>
           </a:p>
         </p:txBody>

</xml_diff>

<commit_message>
Png: Se actualiza el logo del proyecto
</commit_message>
<xml_diff>
--- a/01-Analisis/01-Componente metodologico/Proyecto.pptx
+++ b/01-Analisis/01-Componente metodologico/Proyecto.pptx
@@ -301,7 +301,7 @@
           <a:p>
             <a:fld id="{B3030C24-9424-B24A-8613-79990C3AA492}" type="datetimeFigureOut">
               <a:rPr lang="es-ES" smtClean="0"/>
-              <a:t>12/10/2020</a:t>
+              <a:t>29/06/2021</a:t>
             </a:fld>
             <a:endParaRPr lang="es-ES"/>
           </a:p>
@@ -481,7 +481,7 @@
           <a:p>
             <a:fld id="{B3030C24-9424-B24A-8613-79990C3AA492}" type="datetimeFigureOut">
               <a:rPr lang="es-ES" smtClean="0"/>
-              <a:t>12/10/2020</a:t>
+              <a:t>29/06/2021</a:t>
             </a:fld>
             <a:endParaRPr lang="es-ES"/>
           </a:p>
@@ -1117,7 +1117,7 @@
           <a:p>
             <a:fld id="{B3030C24-9424-B24A-8613-79990C3AA492}" type="datetimeFigureOut">
               <a:rPr lang="es-ES" smtClean="0"/>
-              <a:t>12/10/2020</a:t>
+              <a:t>29/06/2021</a:t>
             </a:fld>
             <a:endParaRPr lang="es-ES"/>
           </a:p>
@@ -1370,7 +1370,7 @@
           <a:p>
             <a:fld id="{B3030C24-9424-B24A-8613-79990C3AA492}" type="datetimeFigureOut">
               <a:rPr lang="es-ES" smtClean="0"/>
-              <a:t>12/10/2020</a:t>
+              <a:t>29/06/2021</a:t>
             </a:fld>
             <a:endParaRPr lang="es-ES"/>
           </a:p>
@@ -1583,7 +1583,7 @@
           <a:p>
             <a:fld id="{B3030C24-9424-B24A-8613-79990C3AA492}" type="datetimeFigureOut">
               <a:rPr lang="es-ES" smtClean="0"/>
-              <a:t>12/10/2020</a:t>
+              <a:t>29/06/2021</a:t>
             </a:fld>
             <a:endParaRPr lang="es-ES"/>
           </a:p>
@@ -2452,15 +2452,9 @@
       </p:grpSpPr>
       <p:pic>
         <p:nvPicPr>
-          <p:cNvPr id="1026" name="Picture 2">
-            <a:extLst>
-              <a:ext uri="{FF2B5EF4-FFF2-40B4-BE49-F238E27FC236}">
-                <a16:creationId xmlns:a16="http://schemas.microsoft.com/office/drawing/2014/main" id="{AEAEE9E9-260A-4C2E-926E-28543D982E7A}"/>
-              </a:ext>
-            </a:extLst>
-          </p:cNvPr>
+          <p:cNvPr id="3" name="Imagen 2"/>
           <p:cNvPicPr>
-            <a:picLocks noChangeAspect="1" noChangeArrowheads="1"/>
+            <a:picLocks noChangeAspect="1"/>
           </p:cNvPicPr>
           <p:nvPr/>
         </p:nvPicPr>
@@ -2472,29 +2466,18 @@
               </a:ext>
             </a:extLst>
           </a:blip>
-          <a:srcRect/>
           <a:stretch>
             <a:fillRect/>
           </a:stretch>
         </p:blipFill>
-        <p:spPr bwMode="auto">
-          <a:xfrm>
-            <a:off x="1777964" y="-627320"/>
-            <a:ext cx="5799137" cy="5143500"/>
+        <p:spPr>
+          <a:xfrm>
+            <a:off x="1533525" y="385762"/>
+            <a:ext cx="6076950" cy="4371975"/>
           </a:xfrm>
           <a:prstGeom prst="rect">
             <a:avLst/>
           </a:prstGeom>
-          <a:noFill/>
-          <a:extLst>
-            <a:ext uri="{909E8E84-426E-40DD-AFC4-6F175D3DCCD1}">
-              <a14:hiddenFill xmlns:a14="http://schemas.microsoft.com/office/drawing/2010/main">
-                <a:solidFill>
-                  <a:srgbClr val="FFFFFF"/>
-                </a:solidFill>
-              </a14:hiddenFill>
-            </a:ext>
-          </a:extLst>
         </p:spPr>
       </p:pic>
     </p:spTree>

</xml_diff>